<commit_message>
MID final for rehearsal
</commit_message>
<xml_diff>
--- a/mid/MID_Instructions.pptx
+++ b/mid/MID_Instructions.pptx
@@ -107,6 +107,11 @@
       </a:defRPr>
     </a:lvl9pPr>
   </p:defaultTextStyle>
+  <p:extLst>
+    <p:ext uri="{EFAFB233-063F-42B5-8137-9DF3F51BA10A}">
+      <p15:sldGuideLst xmlns:p15="http://schemas.microsoft.com/office/powerpoint/2012/main"/>
+    </p:ext>
+  </p:extLst>
 </p:presentation>
 </file>
 
@@ -257,7 +262,7 @@
           <a:p>
             <a:fld id="{3A8DAFF7-A80A-4386-B09D-A5171A32E084}" type="datetimeFigureOut">
               <a:rPr lang="en-US" smtClean="0"/>
-              <a:t>2/5/2025</a:t>
+              <a:t>2/17/2025</a:t>
             </a:fld>
             <a:endParaRPr lang="en-US"/>
           </a:p>
@@ -455,7 +460,7 @@
           <a:p>
             <a:fld id="{3A8DAFF7-A80A-4386-B09D-A5171A32E084}" type="datetimeFigureOut">
               <a:rPr lang="en-US" smtClean="0"/>
-              <a:t>2/5/2025</a:t>
+              <a:t>2/17/2025</a:t>
             </a:fld>
             <a:endParaRPr lang="en-US"/>
           </a:p>
@@ -663,7 +668,7 @@
           <a:p>
             <a:fld id="{3A8DAFF7-A80A-4386-B09D-A5171A32E084}" type="datetimeFigureOut">
               <a:rPr lang="en-US" smtClean="0"/>
-              <a:t>2/5/2025</a:t>
+              <a:t>2/17/2025</a:t>
             </a:fld>
             <a:endParaRPr lang="en-US"/>
           </a:p>
@@ -861,7 +866,7 @@
           <a:p>
             <a:fld id="{3A8DAFF7-A80A-4386-B09D-A5171A32E084}" type="datetimeFigureOut">
               <a:rPr lang="en-US" smtClean="0"/>
-              <a:t>2/5/2025</a:t>
+              <a:t>2/17/2025</a:t>
             </a:fld>
             <a:endParaRPr lang="en-US"/>
           </a:p>
@@ -1136,7 +1141,7 @@
           <a:p>
             <a:fld id="{3A8DAFF7-A80A-4386-B09D-A5171A32E084}" type="datetimeFigureOut">
               <a:rPr lang="en-US" smtClean="0"/>
-              <a:t>2/5/2025</a:t>
+              <a:t>2/17/2025</a:t>
             </a:fld>
             <a:endParaRPr lang="en-US"/>
           </a:p>
@@ -1401,7 +1406,7 @@
           <a:p>
             <a:fld id="{3A8DAFF7-A80A-4386-B09D-A5171A32E084}" type="datetimeFigureOut">
               <a:rPr lang="en-US" smtClean="0"/>
-              <a:t>2/5/2025</a:t>
+              <a:t>2/17/2025</a:t>
             </a:fld>
             <a:endParaRPr lang="en-US"/>
           </a:p>
@@ -1813,7 +1818,7 @@
           <a:p>
             <a:fld id="{3A8DAFF7-A80A-4386-B09D-A5171A32E084}" type="datetimeFigureOut">
               <a:rPr lang="en-US" smtClean="0"/>
-              <a:t>2/5/2025</a:t>
+              <a:t>2/17/2025</a:t>
             </a:fld>
             <a:endParaRPr lang="en-US"/>
           </a:p>
@@ -1954,7 +1959,7 @@
           <a:p>
             <a:fld id="{3A8DAFF7-A80A-4386-B09D-A5171A32E084}" type="datetimeFigureOut">
               <a:rPr lang="en-US" smtClean="0"/>
-              <a:t>2/5/2025</a:t>
+              <a:t>2/17/2025</a:t>
             </a:fld>
             <a:endParaRPr lang="en-US"/>
           </a:p>
@@ -2067,7 +2072,7 @@
           <a:p>
             <a:fld id="{3A8DAFF7-A80A-4386-B09D-A5171A32E084}" type="datetimeFigureOut">
               <a:rPr lang="en-US" smtClean="0"/>
-              <a:t>2/5/2025</a:t>
+              <a:t>2/17/2025</a:t>
             </a:fld>
             <a:endParaRPr lang="en-US"/>
           </a:p>
@@ -2378,7 +2383,7 @@
           <a:p>
             <a:fld id="{3A8DAFF7-A80A-4386-B09D-A5171A32E084}" type="datetimeFigureOut">
               <a:rPr lang="en-US" smtClean="0"/>
-              <a:t>2/5/2025</a:t>
+              <a:t>2/17/2025</a:t>
             </a:fld>
             <a:endParaRPr lang="en-US"/>
           </a:p>
@@ -2666,7 +2671,7 @@
           <a:p>
             <a:fld id="{3A8DAFF7-A80A-4386-B09D-A5171A32E084}" type="datetimeFigureOut">
               <a:rPr lang="en-US" smtClean="0"/>
-              <a:t>2/5/2025</a:t>
+              <a:t>2/17/2025</a:t>
             </a:fld>
             <a:endParaRPr lang="en-US"/>
           </a:p>
@@ -2907,7 +2912,7 @@
           <a:p>
             <a:fld id="{3A8DAFF7-A80A-4386-B09D-A5171A32E084}" type="datetimeFigureOut">
               <a:rPr lang="en-US" smtClean="0"/>
-              <a:t>2/5/2025</a:t>
+              <a:t>2/17/2025</a:t>
             </a:fld>
             <a:endParaRPr lang="en-US"/>
           </a:p>
@@ -4813,7 +4818,7 @@
         </p:nvSpPr>
         <p:spPr>
           <a:xfrm>
-            <a:off x="10195965" y="2370966"/>
+            <a:off x="10191919" y="3081042"/>
             <a:ext cx="1602223" cy="347958"/>
           </a:xfrm>
           <a:prstGeom prst="rect">
@@ -4853,10 +4858,66 @@
           <a:lstStyle/>
           <a:p>
             <a:pPr algn="ctr"/>
-            <a:endParaRPr lang="en-US"/>
-          </a:p>
-        </p:txBody>
-      </p:sp>
+            <a:endParaRPr lang="en-US" dirty="0"/>
+          </a:p>
+        </p:txBody>
+      </p:sp>
+      <p:pic>
+        <p:nvPicPr>
+          <p:cNvPr id="4" name="Picture 2" descr="Green Check Mark PNG Transparent Images Free Download ...">
+            <a:extLst>
+              <a:ext uri="{FF2B5EF4-FFF2-40B4-BE49-F238E27FC236}">
+                <a16:creationId xmlns:a16="http://schemas.microsoft.com/office/drawing/2014/main" id="{402104DA-BF24-886A-4C5C-F3D9E10CFC49}"/>
+              </a:ext>
+            </a:extLst>
+          </p:cNvPr>
+          <p:cNvPicPr>
+            <a:picLocks noChangeAspect="1" noChangeArrowheads="1"/>
+          </p:cNvPicPr>
+          <p:nvPr/>
+        </p:nvPicPr>
+        <p:blipFill>
+          <a:blip r:embed="rId2">
+            <a:extLst>
+              <a:ext uri="{BEBA8EAE-BF5A-486C-A8C5-ECC9F3942E4B}">
+                <a14:imgProps xmlns:a14="http://schemas.microsoft.com/office/drawing/2010/main">
+                  <a14:imgLayer r:embed="rId3">
+                    <a14:imgEffect>
+                      <a14:backgroundRemoval t="10000" b="90000" l="10000" r="90000"/>
+                    </a14:imgEffect>
+                  </a14:imgLayer>
+                </a14:imgProps>
+              </a:ext>
+              <a:ext uri="{28A0092B-C50C-407E-A947-70E740481C1C}">
+                <a14:useLocalDpi xmlns:a14="http://schemas.microsoft.com/office/drawing/2010/main" val="0"/>
+              </a:ext>
+            </a:extLst>
+          </a:blip>
+          <a:srcRect/>
+          <a:stretch>
+            <a:fillRect/>
+          </a:stretch>
+        </p:blipFill>
+        <p:spPr bwMode="auto">
+          <a:xfrm>
+            <a:off x="9388704" y="228467"/>
+            <a:ext cx="3429000" cy="3429000"/>
+          </a:xfrm>
+          <a:prstGeom prst="rect">
+            <a:avLst/>
+          </a:prstGeom>
+          <a:noFill/>
+          <a:extLst>
+            <a:ext uri="{909E8E84-426E-40DD-AFC4-6F175D3DCCD1}">
+              <a14:hiddenFill xmlns:a14="http://schemas.microsoft.com/office/drawing/2010/main">
+                <a:solidFill>
+                  <a:srgbClr val="FFFFFF"/>
+                </a:solidFill>
+              </a14:hiddenFill>
+            </a:ext>
+          </a:extLst>
+        </p:spPr>
+      </p:pic>
     </p:spTree>
     <p:extLst>
       <p:ext uri="{BB962C8B-B14F-4D97-AF65-F5344CB8AC3E}">

</xml_diff>

<commit_message>
Touch ups for ses1
</commit_message>
<xml_diff>
--- a/mid/MID_Instructions.pptx
+++ b/mid/MID_Instructions.pptx
@@ -262,7 +262,7 @@
           <a:p>
             <a:fld id="{3A8DAFF7-A80A-4386-B09D-A5171A32E084}" type="datetimeFigureOut">
               <a:rPr lang="en-US" smtClean="0"/>
-              <a:t>2/18/2025</a:t>
+              <a:t>2/20/2025</a:t>
             </a:fld>
             <a:endParaRPr lang="en-US"/>
           </a:p>
@@ -460,7 +460,7 @@
           <a:p>
             <a:fld id="{3A8DAFF7-A80A-4386-B09D-A5171A32E084}" type="datetimeFigureOut">
               <a:rPr lang="en-US" smtClean="0"/>
-              <a:t>2/18/2025</a:t>
+              <a:t>2/20/2025</a:t>
             </a:fld>
             <a:endParaRPr lang="en-US"/>
           </a:p>
@@ -668,7 +668,7 @@
           <a:p>
             <a:fld id="{3A8DAFF7-A80A-4386-B09D-A5171A32E084}" type="datetimeFigureOut">
               <a:rPr lang="en-US" smtClean="0"/>
-              <a:t>2/18/2025</a:t>
+              <a:t>2/20/2025</a:t>
             </a:fld>
             <a:endParaRPr lang="en-US"/>
           </a:p>
@@ -866,7 +866,7 @@
           <a:p>
             <a:fld id="{3A8DAFF7-A80A-4386-B09D-A5171A32E084}" type="datetimeFigureOut">
               <a:rPr lang="en-US" smtClean="0"/>
-              <a:t>2/18/2025</a:t>
+              <a:t>2/20/2025</a:t>
             </a:fld>
             <a:endParaRPr lang="en-US"/>
           </a:p>
@@ -1141,7 +1141,7 @@
           <a:p>
             <a:fld id="{3A8DAFF7-A80A-4386-B09D-A5171A32E084}" type="datetimeFigureOut">
               <a:rPr lang="en-US" smtClean="0"/>
-              <a:t>2/18/2025</a:t>
+              <a:t>2/20/2025</a:t>
             </a:fld>
             <a:endParaRPr lang="en-US"/>
           </a:p>
@@ -1406,7 +1406,7 @@
           <a:p>
             <a:fld id="{3A8DAFF7-A80A-4386-B09D-A5171A32E084}" type="datetimeFigureOut">
               <a:rPr lang="en-US" smtClean="0"/>
-              <a:t>2/18/2025</a:t>
+              <a:t>2/20/2025</a:t>
             </a:fld>
             <a:endParaRPr lang="en-US"/>
           </a:p>
@@ -1818,7 +1818,7 @@
           <a:p>
             <a:fld id="{3A8DAFF7-A80A-4386-B09D-A5171A32E084}" type="datetimeFigureOut">
               <a:rPr lang="en-US" smtClean="0"/>
-              <a:t>2/18/2025</a:t>
+              <a:t>2/20/2025</a:t>
             </a:fld>
             <a:endParaRPr lang="en-US"/>
           </a:p>
@@ -1959,7 +1959,7 @@
           <a:p>
             <a:fld id="{3A8DAFF7-A80A-4386-B09D-A5171A32E084}" type="datetimeFigureOut">
               <a:rPr lang="en-US" smtClean="0"/>
-              <a:t>2/18/2025</a:t>
+              <a:t>2/20/2025</a:t>
             </a:fld>
             <a:endParaRPr lang="en-US"/>
           </a:p>
@@ -2072,7 +2072,7 @@
           <a:p>
             <a:fld id="{3A8DAFF7-A80A-4386-B09D-A5171A32E084}" type="datetimeFigureOut">
               <a:rPr lang="en-US" smtClean="0"/>
-              <a:t>2/18/2025</a:t>
+              <a:t>2/20/2025</a:t>
             </a:fld>
             <a:endParaRPr lang="en-US"/>
           </a:p>
@@ -2383,7 +2383,7 @@
           <a:p>
             <a:fld id="{3A8DAFF7-A80A-4386-B09D-A5171A32E084}" type="datetimeFigureOut">
               <a:rPr lang="en-US" smtClean="0"/>
-              <a:t>2/18/2025</a:t>
+              <a:t>2/20/2025</a:t>
             </a:fld>
             <a:endParaRPr lang="en-US"/>
           </a:p>
@@ -2671,7 +2671,7 @@
           <a:p>
             <a:fld id="{3A8DAFF7-A80A-4386-B09D-A5171A32E084}" type="datetimeFigureOut">
               <a:rPr lang="en-US" smtClean="0"/>
-              <a:t>2/18/2025</a:t>
+              <a:t>2/20/2025</a:t>
             </a:fld>
             <a:endParaRPr lang="en-US"/>
           </a:p>
@@ -2912,7 +2912,7 @@
           <a:p>
             <a:fld id="{3A8DAFF7-A80A-4386-B09D-A5171A32E084}" type="datetimeFigureOut">
               <a:rPr lang="en-US" smtClean="0"/>
-              <a:t>2/18/2025</a:t>
+              <a:t>2/20/2025</a:t>
             </a:fld>
             <a:endParaRPr lang="en-US"/>
           </a:p>
@@ -3626,25 +3626,7 @@
                 </a:solidFill>
                 <a:latin typeface="Aptos" panose="02110004020202020204"/>
               </a:rPr>
-              <a:t>n the white square is preceded by a GREEN CIRCLE, you can </a:t>
-            </a:r>
-            <a:r>
-              <a:rPr lang="en-US">
-                <a:solidFill>
-                  <a:prstClr val="white"/>
-                </a:solidFill>
-                <a:latin typeface="Aptos" panose="02110004020202020204"/>
-              </a:rPr>
-              <a:t>WIN $4 </a:t>
-            </a:r>
-            <a:r>
-              <a:rPr lang="en-US" dirty="0">
-                <a:solidFill>
-                  <a:prstClr val="white"/>
-                </a:solidFill>
-                <a:latin typeface="Aptos" panose="02110004020202020204"/>
-              </a:rPr>
-              <a:t>if you respond in time</a:t>
+              <a:t>n the white square is preceded by a GREEN CIRCLE, you can WIN $3 if you respond in time</a:t>
             </a:r>
             <a:endParaRPr kumimoji="0" lang="en-US" sz="1800" b="0" i="0" u="none" strike="noStrike" kern="1200" cap="none" spc="0" normalizeH="0" baseline="0" noProof="0" dirty="0">
               <a:ln>
@@ -4011,7 +3993,7 @@
         <p:spPr>
           <a:xfrm>
             <a:off x="2706147" y="4657725"/>
-            <a:ext cx="6711389" cy="369332"/>
+            <a:ext cx="6664901" cy="646331"/>
           </a:xfrm>
           <a:prstGeom prst="rect">
             <a:avLst/>
@@ -4056,7 +4038,69 @@
                 <a:ea typeface="+mn-ea"/>
                 <a:cs typeface="+mn-cs"/>
               </a:rPr>
-              <a:t>If you do NOT respond in time, you will not gain or lose any money. </a:t>
+              <a:t>If you do NOT respond in time, you will not gain or lose any money.</a:t>
+            </a:r>
+          </a:p>
+          <a:p>
+            <a:pPr marL="0" marR="0" lvl="0" indent="0" algn="ctr" defTabSz="914400" rtl="0" eaLnBrk="1" fontAlgn="auto" latinLnBrk="0" hangingPunct="1">
+              <a:lnSpc>
+                <a:spcPct val="100000"/>
+              </a:lnSpc>
+              <a:spcBef>
+                <a:spcPts val="0"/>
+              </a:spcBef>
+              <a:spcAft>
+                <a:spcPts val="0"/>
+              </a:spcAft>
+              <a:buClrTx/>
+              <a:buSzTx/>
+              <a:buFontTx/>
+              <a:buNone/>
+              <a:tabLst/>
+              <a:defRPr/>
+            </a:pPr>
+            <a:r>
+              <a:rPr kumimoji="0" lang="en-US" sz="1800" b="0" i="0" u="none" strike="noStrike" kern="1200" cap="none" spc="0" normalizeH="0" baseline="0" noProof="0" dirty="0">
+                <a:ln>
+                  <a:noFill/>
+                </a:ln>
+                <a:solidFill>
+                  <a:prstClr val="white"/>
+                </a:solidFill>
+                <a:effectLst/>
+                <a:uLnTx/>
+                <a:uFillTx/>
+                <a:latin typeface="Aptos" panose="02110004020202020204"/>
+                <a:ea typeface="+mn-ea"/>
+                <a:cs typeface="+mn-cs"/>
+              </a:rPr>
+              <a:t>You cannot lose any money during this </a:t>
+            </a:r>
+            <a:r>
+              <a:rPr lang="en-US" dirty="0">
+                <a:solidFill>
+                  <a:prstClr val="white"/>
+                </a:solidFill>
+                <a:latin typeface="Aptos" panose="02110004020202020204"/>
+              </a:rPr>
+              <a:t>task.</a:t>
+            </a:r>
+            <a:r>
+              <a:rPr kumimoji="0" lang="en-US" sz="1800" b="0" i="0" u="none" strike="noStrike" kern="1200" cap="none" spc="0" normalizeH="0" baseline="0" noProof="0" dirty="0">
+                <a:ln>
+                  <a:noFill/>
+                </a:ln>
+                <a:solidFill>
+                  <a:prstClr val="white"/>
+                </a:solidFill>
+                <a:effectLst/>
+                <a:uLnTx/>
+                <a:uFillTx/>
+                <a:latin typeface="Aptos" panose="02110004020202020204"/>
+                <a:ea typeface="+mn-ea"/>
+                <a:cs typeface="+mn-cs"/>
+              </a:rPr>
+              <a:t> </a:t>
             </a:r>
           </a:p>
         </p:txBody>

</xml_diff>